<commit_message>
Updated presentation with QR code of repo
</commit_message>
<xml_diff>
--- a/Minecraft/Minecraft Does Devops.pptx
+++ b/Minecraft/Minecraft Does Devops.pptx
@@ -152,6 +152,11 @@
       </a:defRPr>
     </a:lvl9pPr>
   </p:defaultTextStyle>
+  <p:extLst>
+    <p:ext uri="{EFAFB233-063F-42B5-8137-9DF3F51BA10A}">
+      <p15:sldGuideLst xmlns:p15="http://schemas.microsoft.com/office/powerpoint/2012/main"/>
+    </p:ext>
+  </p:extLst>
 </p:presentation>
 </file>
 
@@ -3604,7 +3609,7 @@
           <a:p>
             <a:fld id="{0A0A5512-2D8B-4830-BC21-39D17EC77EDC}" type="datetimeFigureOut">
               <a:rPr lang="en-US" smtClean="0"/>
-              <a:t>10/11/2024</a:t>
+              <a:t>10/12/2024</a:t>
             </a:fld>
             <a:endParaRPr lang="en-US"/>
           </a:p>
@@ -8177,7 +8182,7 @@
             <a:fld id="{A5B0A250-5CC0-1746-B209-08E8B0DAE6AF}" type="datetimeFigureOut">
               <a:rPr lang="en-US" smtClean="0"/>
               <a:pPr algn="l"/>
-              <a:t>10/11/2024</a:t>
+              <a:t>10/12/2024</a:t>
             </a:fld>
             <a:endParaRPr lang="en-US" dirty="0"/>
           </a:p>
@@ -9639,7 +9644,7 @@
           <a:p>
             <a:fld id="{A5B0A250-5CC0-1746-B209-08E8B0DAE6AF}" type="datetimeFigureOut">
               <a:rPr lang="en-US" smtClean="0"/>
-              <a:t>10/11/2024</a:t>
+              <a:t>10/12/2024</a:t>
             </a:fld>
             <a:endParaRPr lang="en-US" dirty="0"/>
           </a:p>
@@ -10569,7 +10574,7 @@
           <a:p>
             <a:fld id="{A5B0A250-5CC0-1746-B209-08E8B0DAE6AF}" type="datetimeFigureOut">
               <a:rPr lang="en-US" smtClean="0"/>
-              <a:t>10/11/2024</a:t>
+              <a:t>10/12/2024</a:t>
             </a:fld>
             <a:endParaRPr lang="en-US"/>
           </a:p>
@@ -12026,7 +12031,7 @@
           <a:p>
             <a:fld id="{A5B0A250-5CC0-1746-B209-08E8B0DAE6AF}" type="datetimeFigureOut">
               <a:rPr lang="en-US" smtClean="0"/>
-              <a:t>10/11/2024</a:t>
+              <a:t>10/12/2024</a:t>
             </a:fld>
             <a:endParaRPr lang="en-US" dirty="0"/>
           </a:p>
@@ -14382,7 +14387,7 @@
           <a:p>
             <a:fld id="{A5B0A250-5CC0-1746-B209-08E8B0DAE6AF}" type="datetimeFigureOut">
               <a:rPr lang="en-US" smtClean="0"/>
-              <a:t>10/11/2024</a:t>
+              <a:t>10/12/2024</a:t>
             </a:fld>
             <a:endParaRPr lang="en-US" dirty="0"/>
           </a:p>
@@ -15423,7 +15428,7 @@
           <a:p>
             <a:fld id="{A5B0A250-5CC0-1746-B209-08E8B0DAE6AF}" type="datetimeFigureOut">
               <a:rPr lang="en-US" smtClean="0"/>
-              <a:t>10/11/2024</a:t>
+              <a:t>10/12/2024</a:t>
             </a:fld>
             <a:endParaRPr lang="en-US" dirty="0"/>
           </a:p>
@@ -16636,7 +16641,7 @@
           <a:p>
             <a:fld id="{A5B0A250-5CC0-1746-B209-08E8B0DAE6AF}" type="datetimeFigureOut">
               <a:rPr lang="en-US" smtClean="0"/>
-              <a:t>10/11/2024</a:t>
+              <a:t>10/12/2024</a:t>
             </a:fld>
             <a:endParaRPr lang="en-US" dirty="0"/>
           </a:p>
@@ -17545,7 +17550,7 @@
           <a:p>
             <a:fld id="{A5B0A250-5CC0-1746-B209-08E8B0DAE6AF}" type="datetimeFigureOut">
               <a:rPr lang="en-US" smtClean="0"/>
-              <a:t>10/11/2024</a:t>
+              <a:t>10/12/2024</a:t>
             </a:fld>
             <a:endParaRPr lang="en-US" dirty="0"/>
           </a:p>
@@ -17704,7 +17709,7 @@
             <a:fld id="{A5B0A250-5CC0-1746-B209-08E8B0DAE6AF}" type="datetimeFigureOut">
               <a:rPr lang="en-US" smtClean="0"/>
               <a:pPr/>
-              <a:t>10/11/2024</a:t>
+              <a:t>10/12/2024</a:t>
             </a:fld>
             <a:endParaRPr lang="en-US" dirty="0"/>
           </a:p>
@@ -18687,7 +18692,7 @@
           <a:p>
             <a:fld id="{A5B0A250-5CC0-1746-B209-08E8B0DAE6AF}" type="datetimeFigureOut">
               <a:rPr lang="en-US" smtClean="0"/>
-              <a:t>10/11/2024</a:t>
+              <a:t>10/12/2024</a:t>
             </a:fld>
             <a:endParaRPr lang="en-US" dirty="0"/>
           </a:p>
@@ -19749,7 +19754,7 @@
           <a:p>
             <a:fld id="{A5B0A250-5CC0-1746-B209-08E8B0DAE6AF}" type="datetimeFigureOut">
               <a:rPr lang="en-US" smtClean="0"/>
-              <a:t>10/11/2024</a:t>
+              <a:t>10/12/2024</a:t>
             </a:fld>
             <a:endParaRPr lang="en-US" dirty="0"/>
           </a:p>
@@ -20037,7 +20042,7 @@
             <a:fld id="{A5B0A250-5CC0-1746-B209-08E8B0DAE6AF}" type="datetimeFigureOut">
               <a:rPr lang="en-US" smtClean="0"/>
               <a:pPr/>
-              <a:t>10/11/2024</a:t>
+              <a:t>10/12/2024</a:t>
             </a:fld>
             <a:endParaRPr lang="en-US" dirty="0"/>
           </a:p>
@@ -21486,6 +21491,42 @@
           </a:fontRef>
         </p:style>
       </p:cxnSp>
+      <p:pic>
+        <p:nvPicPr>
+          <p:cNvPr id="6" name="Picture 5" descr="A qr code on a white background&#10;&#10;Description automatically generated">
+            <a:extLst>
+              <a:ext uri="{FF2B5EF4-FFF2-40B4-BE49-F238E27FC236}">
+                <a16:creationId xmlns:a16="http://schemas.microsoft.com/office/drawing/2014/main" id="{41974608-5CBD-105C-6F7D-821672439772}"/>
+              </a:ext>
+            </a:extLst>
+          </p:cNvPr>
+          <p:cNvPicPr>
+            <a:picLocks noChangeAspect="1"/>
+          </p:cNvPicPr>
+          <p:nvPr/>
+        </p:nvPicPr>
+        <p:blipFill>
+          <a:blip r:embed="rId3">
+            <a:extLst>
+              <a:ext uri="{28A0092B-C50C-407E-A947-70E740481C1C}">
+                <a14:useLocalDpi xmlns:a14="http://schemas.microsoft.com/office/drawing/2010/main" val="0"/>
+              </a:ext>
+            </a:extLst>
+          </a:blip>
+          <a:stretch>
+            <a:fillRect/>
+          </a:stretch>
+        </p:blipFill>
+        <p:spPr>
+          <a:xfrm>
+            <a:off x="7335673" y="3321702"/>
+            <a:ext cx="2762249" cy="2762249"/>
+          </a:xfrm>
+          <a:prstGeom prst="rect">
+            <a:avLst/>
+          </a:prstGeom>
+        </p:spPr>
+      </p:pic>
     </p:spTree>
     <p:extLst>
       <p:ext uri="{BB962C8B-B14F-4D97-AF65-F5344CB8AC3E}">

</xml_diff>